<commit_message>
update PPX with release branch
</commit_message>
<xml_diff>
--- a/PresentationProjet2.pptx
+++ b/PresentationProjet2.pptx
@@ -28010,7 +28010,7 @@
         <p:spPr>
           <a:xfrm>
             <a:off x="1753507" y="1838652"/>
-            <a:ext cx="4572000" cy="2031325"/>
+            <a:ext cx="4572000" cy="2893100"/>
           </a:xfrm>
           <a:prstGeom prst="rect">
             <a:avLst/>
@@ -28040,13 +28040,31 @@
           <a:p>
             <a:r>
               <a:rPr lang="fr-FR" dirty="0"/>
+              <a:t>url git de la dernière release : </a:t>
+            </a:r>
+          </a:p>
+          <a:p>
+            <a:r>
+              <a:rPr lang="en-US" dirty="0">
+                <a:hlinkClick r:id="rId5"/>
+              </a:rPr>
+              <a:t>https://github.com/USL35/Project_DA_Java_EN_Come_to_the_Rescue_of_a_Java_Application/tree/release</a:t>
+            </a:r>
+            <a:endParaRPr lang="en-US" dirty="0"/>
+          </a:p>
+          <a:p>
+            <a:endParaRPr lang="en-US" dirty="0"/>
+          </a:p>
+          <a:p>
+            <a:r>
+              <a:rPr lang="fr-FR" dirty="0"/>
               <a:t>Fork du travail d’Alex présent sur le repository :</a:t>
             </a:r>
           </a:p>
           <a:p>
             <a:r>
               <a:rPr lang="fr-FR" dirty="0">
-                <a:hlinkClick r:id="rId5"/>
+                <a:hlinkClick r:id="rId6"/>
               </a:rPr>
               <a:t>https://github.com/OpenClassrooms-Student-Center/Project_DA_Java_EN_Come_to_the_Rescue_of_a_Java_Application/tree/master/Project02Eclipse</a:t>
             </a:r>

</xml_diff>